<commit_message>
Weihnachtsmütze zu Dingus hinzugefügt
</commit_message>
<xml_diff>
--- a/Präsentationen/00_Ideenvorstellung/ideenvorstellung.pptx
+++ b/Präsentationen/00_Ideenvorstellung/ideenvorstellung.pptx
@@ -239,7 +239,7 @@
             <a:pPr rtl="0"/>
             <a:fld id="{CBAF28FC-EEDF-4ADE-8DD8-6B6FDAE595B5}" type="datetime1">
               <a:rPr lang="de-DE" smtClean="0"/>
-              <a:t>14.12.2022</a:t>
+              <a:t>20.12.2022</a:t>
             </a:fld>
             <a:endParaRPr lang="de-DE"/>
           </a:p>
@@ -421,7 +421,7 @@
             <a:pPr rtl="0"/>
             <a:fld id="{14DBC5CC-54D7-4FDA-9C5E-6B3403E5AEA6}" type="datetime1">
               <a:rPr lang="de-DE" smtClean="0"/>
-              <a:t>14.12.2022</a:t>
+              <a:t>20.12.2022</a:t>
             </a:fld>
             <a:endParaRPr lang="de-DE"/>
           </a:p>
@@ -789,7 +789,7 @@
             <a:pPr rtl="0"/>
             <a:fld id="{0CBB3949-A74E-4375-9902-BE6F3E4041B8}" type="datetime1">
               <a:rPr lang="de-DE" smtClean="0"/>
-              <a:t>14.12.2022</a:t>
+              <a:t>20.12.2022</a:t>
             </a:fld>
             <a:endParaRPr lang="de-DE"/>
           </a:p>
@@ -905,7 +905,7 @@
             <a:pPr rtl="0"/>
             <a:fld id="{8329F44B-9298-4AA7-A5DA-7D2EEE7FF61C}" type="datetime1">
               <a:rPr lang="de-DE" smtClean="0"/>
-              <a:t>14.12.2022</a:t>
+              <a:t>20.12.2022</a:t>
             </a:fld>
             <a:endParaRPr lang="de-DE"/>
           </a:p>
@@ -1021,7 +1021,7 @@
             <a:pPr rtl="0"/>
             <a:fld id="{8329F44B-9298-4AA7-A5DA-7D2EEE7FF61C}" type="datetime1">
               <a:rPr lang="de-DE" smtClean="0"/>
-              <a:t>14.12.2022</a:t>
+              <a:t>20.12.2022</a:t>
             </a:fld>
             <a:endParaRPr lang="de-DE"/>
           </a:p>
@@ -1137,7 +1137,7 @@
             <a:pPr rtl="0"/>
             <a:fld id="{8329F44B-9298-4AA7-A5DA-7D2EEE7FF61C}" type="datetime1">
               <a:rPr lang="de-DE" smtClean="0"/>
-              <a:t>14.12.2022</a:t>
+              <a:t>20.12.2022</a:t>
             </a:fld>
             <a:endParaRPr lang="de-DE"/>
           </a:p>
@@ -1253,7 +1253,7 @@
             <a:pPr rtl="0"/>
             <a:fld id="{8329F44B-9298-4AA7-A5DA-7D2EEE7FF61C}" type="datetime1">
               <a:rPr lang="de-DE" smtClean="0"/>
-              <a:t>14.12.2022</a:t>
+              <a:t>20.12.2022</a:t>
             </a:fld>
             <a:endParaRPr lang="de-DE"/>
           </a:p>
@@ -1369,7 +1369,7 @@
             <a:pPr rtl="0"/>
             <a:fld id="{A94A838A-A666-46A4-92C0-E6AED990629C}" type="datetime1">
               <a:rPr lang="de-DE" smtClean="0"/>
-              <a:t>14.12.2022</a:t>
+              <a:t>20.12.2022</a:t>
             </a:fld>
             <a:endParaRPr lang="de-DE"/>
           </a:p>
@@ -13649,8 +13649,37 @@
         </p:blipFill>
         <p:spPr>
           <a:xfrm>
-            <a:off x="627062" y="545285"/>
+            <a:off x="601896" y="1051551"/>
             <a:ext cx="5633625" cy="5620624"/>
+          </a:xfrm>
+          <a:prstGeom prst="rect">
+            <a:avLst/>
+          </a:prstGeom>
+        </p:spPr>
+      </p:pic>
+      <p:pic>
+        <p:nvPicPr>
+          <p:cNvPr id="6" name="Grafik 5">
+            <a:extLst>
+              <a:ext uri="{FF2B5EF4-FFF2-40B4-BE49-F238E27FC236}">
+                <a16:creationId xmlns:a16="http://schemas.microsoft.com/office/drawing/2014/main" id="{B7ACC120-8EE5-43D9-6FCF-1B7552FE35A3}"/>
+              </a:ext>
+            </a:extLst>
+          </p:cNvPr>
+          <p:cNvPicPr>
+            <a:picLocks noChangeAspect="1"/>
+          </p:cNvPicPr>
+          <p:nvPr/>
+        </p:nvPicPr>
+        <p:blipFill rotWithShape="1">
+          <a:blip r:embed="rId5"/>
+          <a:srcRect l="7246" t="11131" r="5905" b="14996"/>
+          <a:stretch/>
+        </p:blipFill>
+        <p:spPr>
+          <a:xfrm>
+            <a:off x="1166070" y="-394719"/>
+            <a:ext cx="3884103" cy="2520890"/>
           </a:xfrm>
           <a:prstGeom prst="rect">
             <a:avLst/>
@@ -21496,15 +21525,6 @@
 </file>
 
 <file path=customXml/item1.xml><?xml version="1.0" encoding="utf-8"?>
-<?mso-contentType ?>
-<FormTemplates xmlns="http://schemas.microsoft.com/sharepoint/v3/contenttype/forms">
-  <Display>DocumentLibraryForm</Display>
-  <Edit>DocumentLibraryForm</Edit>
-  <New>DocumentLibraryForm</New>
-</FormTemplates>
-</file>
-
-<file path=customXml/item2.xml><?xml version="1.0" encoding="utf-8"?>
 <ct:contentTypeSchema xmlns:ct="http://schemas.microsoft.com/office/2006/metadata/contentType" xmlns:ma="http://schemas.microsoft.com/office/2006/metadata/properties/metaAttributes" ct:_="" ma:_="" ma:contentTypeName="Document" ma:contentTypeID="0x01010079F111ED35F8CC479449609E8A0923A6" ma:contentTypeVersion="18" ma:contentTypeDescription="Create a new document." ma:contentTypeScope="" ma:versionID="22a266b9fa9a230c5a512669d8b298c3">
   <xsd:schema xmlns:xsd="http://www.w3.org/2001/XMLSchema" xmlns:xs="http://www.w3.org/2001/XMLSchema" xmlns:p="http://schemas.microsoft.com/office/2006/metadata/properties" xmlns:ns1="http://schemas.microsoft.com/sharepoint/v3" xmlns:ns2="71af3243-3dd4-4a8d-8c0d-dd76da1f02a5" xmlns:ns3="16c05727-aa75-4e4a-9b5f-8a80a1165891" xmlns:ns4="230e9df3-be65-4c73-a93b-d1236ebd677e" targetNamespace="http://schemas.microsoft.com/office/2006/metadata/properties" ma:root="true" ma:fieldsID="eddc33fff6b14141ee5c74a0d29ea6a1" ns1:_="" ns2:_="" ns3:_="" ns4:_="">
     <xsd:import namespace="http://schemas.microsoft.com/sharepoint/v3"/>
@@ -21780,6 +21800,15 @@
 </ct:contentTypeSchema>
 </file>
 
+<file path=customXml/item2.xml><?xml version="1.0" encoding="utf-8"?>
+<?mso-contentType ?>
+<FormTemplates xmlns="http://schemas.microsoft.com/sharepoint/v3/contenttype/forms">
+  <Display>DocumentLibraryForm</Display>
+  <Edit>DocumentLibraryForm</Edit>
+  <New>DocumentLibraryForm</New>
+</FormTemplates>
+</file>
+
 <file path=customXml/item3.xml><?xml version="1.0" encoding="utf-8"?>
 <p:properties xmlns:p="http://schemas.microsoft.com/office/2006/metadata/properties" xmlns:xsi="http://www.w3.org/2001/XMLSchema-instance" xmlns:pc="http://schemas.microsoft.com/office/infopath/2007/PartnerControls">
   <documentManagement>
@@ -21800,14 +21829,6 @@
 </file>
 
 <file path=customXml/itemProps1.xml><?xml version="1.0" encoding="utf-8"?>
-<ds:datastoreItem xmlns:ds="http://schemas.openxmlformats.org/officeDocument/2006/customXml" ds:itemID="{904751AB-E840-446F-8D49-E697067EC887}">
-  <ds:schemaRefs>
-    <ds:schemaRef ds:uri="http://schemas.microsoft.com/sharepoint/v3/contenttype/forms"/>
-  </ds:schemaRefs>
-</ds:datastoreItem>
-</file>
-
-<file path=customXml/itemProps2.xml><?xml version="1.0" encoding="utf-8"?>
 <ds:datastoreItem xmlns:ds="http://schemas.openxmlformats.org/officeDocument/2006/customXml" ds:itemID="{DE4876F9-7AE1-498D-B8FE-1E3AD703D2AF}">
   <ds:schemaRefs>
     <ds:schemaRef ds:uri="http://schemas.microsoft.com/office/2006/metadata/contentType"/>
@@ -21824,6 +21845,14 @@
     <ds:schemaRef ds:uri="http://purl.org/dc/elements/1.1/"/>
     <ds:schemaRef ds:uri="http://purl.org/dc/terms/"/>
     <ds:schemaRef ds:uri="http://schemas.microsoft.com/internal/obd"/>
+  </ds:schemaRefs>
+</ds:datastoreItem>
+</file>
+
+<file path=customXml/itemProps2.xml><?xml version="1.0" encoding="utf-8"?>
+<ds:datastoreItem xmlns:ds="http://schemas.openxmlformats.org/officeDocument/2006/customXml" ds:itemID="{904751AB-E840-446F-8D49-E697067EC887}">
+  <ds:schemaRefs>
+    <ds:schemaRef ds:uri="http://schemas.microsoft.com/sharepoint/v3/contenttype/forms"/>
   </ds:schemaRefs>
 </ds:datastoreItem>
 </file>

</xml_diff>